<commit_message>
Alterações Web Service SOAP + Relatorio ISI
</commit_message>
<xml_diff>
--- a/Ilustrações/poster_PA_LESI.pptx
+++ b/Ilustrações/poster_PA_LESI.pptx
@@ -116,16 +116,6 @@
 <p:cmAuthorLst xmlns:a="http://schemas.openxmlformats.org/drawingml/2006/main" xmlns:r="http://schemas.openxmlformats.org/officeDocument/2006/relationships" xmlns:p="http://schemas.openxmlformats.org/presentationml/2006/main">
   <p:cmAuthor id="0" name="Alberto Simoes" initials="AS" lastIdx="1" clrIdx="0"/>
 </p:cmAuthorLst>
-</file>
-
-<file path=ppt/comments/comment1.xml><?xml version="1.0" encoding="utf-8"?>
-<p:cmLst xmlns:a="http://schemas.openxmlformats.org/drawingml/2006/main" xmlns:r="http://schemas.openxmlformats.org/officeDocument/2006/relationships" xmlns:p="http://schemas.openxmlformats.org/presentationml/2006/main">
-  <p:cm authorId="0" dt="2021-03-31T16:53:54" idx="1">
-    <p:pos x="3075" y="3175"/>
-    <p:text>These sections are examples. Feel free to reorganize the contents.
-A poster is more visual than textual. Try to use a set of images, diagrams or other visual tools to present your work goals.</p:text>
-  </p:cm>
-</p:cmLst>
 </file>
 
 <file path=ppt/slideLayouts/slideLayout1.xml><?xml version="1.0" encoding="utf-8"?>
@@ -2736,7 +2726,7 @@
         <p:spPr>
           <a:xfrm>
             <a:off x="1525680" y="19916280"/>
-            <a:ext cx="5646600" cy="470520"/>
+            <a:ext cx="5646600" cy="449439"/>
           </a:xfrm>
           <a:prstGeom prst="rect">
             <a:avLst/>
@@ -2770,44 +2760,29 @@
               </a:lnSpc>
             </a:pPr>
             <a:r>
-              <a:rPr lang="pt-PT" sz="2400" b="0" strike="noStrike" spc="-1" dirty="0" err="1">
-                <a:solidFill>
-                  <a:srgbClr val="004B87"/>
-                </a:solidFill>
-                <a:latin typeface="Calibri"/>
-              </a:rPr>
-              <a:t>Write</a:t>
-            </a:r>
-            <a:r>
-              <a:rPr lang="pt-PT" sz="2400" b="0" strike="noStrike" spc="-1" dirty="0">
-                <a:solidFill>
-                  <a:srgbClr val="004B87"/>
-                </a:solidFill>
-                <a:latin typeface="Calibri"/>
-              </a:rPr>
-              <a:t> </a:t>
-            </a:r>
-            <a:r>
-              <a:rPr lang="pt-PT" sz="2400" b="0" strike="noStrike" spc="-1" dirty="0" err="1">
-                <a:solidFill>
-                  <a:srgbClr val="004B87"/>
-                </a:solidFill>
-                <a:latin typeface="Calibri"/>
-              </a:rPr>
-              <a:t>here</a:t>
-            </a:r>
-            <a:r>
-              <a:rPr lang="pt-PT" sz="2400" b="0" strike="noStrike" spc="-1" dirty="0">
-                <a:solidFill>
-                  <a:srgbClr val="004B87"/>
-                </a:solidFill>
-                <a:latin typeface="Calibri"/>
-              </a:rPr>
-              <a:t>...</a:t>
-            </a:r>
-            <a:endParaRPr lang="en-US" sz="2400" b="0" strike="noStrike" spc="-1" dirty="0">
-              <a:latin typeface="Arial"/>
-            </a:endParaRPr>
+              <a:rPr lang="en-US" sz="2400" b="0" strike="noStrike" spc="-1" dirty="0" err="1">
+                <a:latin typeface="Arial"/>
+              </a:rPr>
+              <a:t>Falar</a:t>
+            </a:r>
+            <a:r>
+              <a:rPr lang="en-US" sz="2400" b="0" strike="noStrike" spc="-1" dirty="0">
+                <a:latin typeface="Arial"/>
+              </a:rPr>
+              <a:t> do </a:t>
+            </a:r>
+            <a:r>
+              <a:rPr lang="en-US" sz="2400" b="0" strike="noStrike" spc="-1" dirty="0" err="1">
+                <a:latin typeface="Arial"/>
+              </a:rPr>
+              <a:t>produto</a:t>
+            </a:r>
+            <a:r>
+              <a:rPr lang="en-US" sz="2400" b="0" strike="noStrike" spc="-1" dirty="0">
+                <a:latin typeface="Arial"/>
+              </a:rPr>
+              <a:t> final</a:t>
+            </a:r>
           </a:p>
         </p:txBody>
       </p:sp>
@@ -3187,15 +3162,33 @@
               </a:lnSpc>
             </a:pPr>
             <a:r>
-              <a:rPr lang="pt-PT" sz="2400" b="0" strike="noStrike" spc="-1">
-                <a:solidFill>
-                  <a:srgbClr val="004B87"/>
-                </a:solidFill>
-                <a:latin typeface="Calibri"/>
-              </a:rPr>
-              <a:t>Write here...</a:t>
-            </a:r>
-            <a:endParaRPr lang="en-US" sz="2400" b="0" strike="noStrike" spc="-1">
+              <a:rPr lang="pt-PT" sz="2400" b="0" strike="noStrike" spc="-1" dirty="0">
+                <a:solidFill>
+                  <a:srgbClr val="004B87"/>
+                </a:solidFill>
+                <a:latin typeface="Calibri"/>
+              </a:rPr>
+              <a:t>Falar de </a:t>
+            </a:r>
+            <a:r>
+              <a:rPr lang="pt-PT" sz="2400" b="0" strike="noStrike" spc="-1" dirty="0" err="1">
+                <a:solidFill>
+                  <a:srgbClr val="004B87"/>
+                </a:solidFill>
+                <a:latin typeface="Calibri"/>
+              </a:rPr>
+              <a:t>Scrum</a:t>
+            </a:r>
+            <a:r>
+              <a:rPr lang="pt-PT" sz="2400" b="0" strike="noStrike" spc="-1" dirty="0">
+                <a:solidFill>
+                  <a:srgbClr val="004B87"/>
+                </a:solidFill>
+                <a:latin typeface="Calibri"/>
+              </a:rPr>
+              <a:t> e como nós trabalhamos</a:t>
+            </a:r>
+            <a:endParaRPr lang="en-US" sz="2400" b="0" strike="noStrike" spc="-1" dirty="0">
               <a:latin typeface="Arial"/>
             </a:endParaRPr>
           </a:p>
@@ -3244,15 +3237,42 @@
               </a:lnSpc>
             </a:pPr>
             <a:r>
-              <a:rPr lang="pt-PT" sz="2400" b="0" strike="noStrike" spc="-1">
-                <a:solidFill>
-                  <a:srgbClr val="004B87"/>
-                </a:solidFill>
-                <a:latin typeface="Calibri"/>
-              </a:rPr>
-              <a:t>Write here...</a:t>
-            </a:r>
-            <a:endParaRPr lang="en-US" sz="2400" b="0" strike="noStrike" spc="-1">
+              <a:rPr lang="pt-PT" sz="2400" b="0" strike="noStrike" spc="-1" dirty="0" err="1">
+                <a:solidFill>
+                  <a:srgbClr val="004B87"/>
+                </a:solidFill>
+                <a:latin typeface="Calibri"/>
+              </a:rPr>
+              <a:t>Write</a:t>
+            </a:r>
+            <a:r>
+              <a:rPr lang="pt-PT" sz="2400" b="0" strike="noStrike" spc="-1" dirty="0">
+                <a:solidFill>
+                  <a:srgbClr val="004B87"/>
+                </a:solidFill>
+                <a:latin typeface="Calibri"/>
+              </a:rPr>
+              <a:t> </a:t>
+            </a:r>
+            <a:r>
+              <a:rPr lang="pt-PT" sz="2400" b="0" strike="noStrike" spc="-1" dirty="0" err="1">
+                <a:solidFill>
+                  <a:srgbClr val="004B87"/>
+                </a:solidFill>
+                <a:latin typeface="Calibri"/>
+              </a:rPr>
+              <a:t>here</a:t>
+            </a:r>
+            <a:r>
+              <a:rPr lang="pt-PT" sz="2400" b="0" strike="noStrike" spc="-1" dirty="0">
+                <a:solidFill>
+                  <a:srgbClr val="004B87"/>
+                </a:solidFill>
+                <a:latin typeface="Calibri"/>
+              </a:rPr>
+              <a:t>...</a:t>
+            </a:r>
+            <a:endParaRPr lang="en-US" sz="2400" b="0" strike="noStrike" spc="-1" dirty="0">
               <a:latin typeface="Arial"/>
             </a:endParaRPr>
           </a:p>
@@ -3742,7 +3762,7 @@
         <p:spPr>
           <a:xfrm>
             <a:off x="14457600" y="19916280"/>
-            <a:ext cx="5646600" cy="357120"/>
+            <a:ext cx="5646600" cy="898792"/>
           </a:xfrm>
           <a:prstGeom prst="rect">
             <a:avLst/>
@@ -3776,13 +3796,29 @@
               </a:lnSpc>
             </a:pPr>
             <a:r>
+              <a:rPr lang="pt-PT" sz="1800" b="0" strike="noStrike" spc="-1" dirty="0">
+                <a:solidFill>
+                  <a:srgbClr val="004B87"/>
+                </a:solidFill>
+                <a:latin typeface="Calibri"/>
+              </a:rPr>
+              <a:t>Aulas de AMS e PES [?]</a:t>
+            </a:r>
+          </a:p>
+          <a:p>
+            <a:pPr algn="just">
+              <a:lnSpc>
+                <a:spcPts val="2100"/>
+              </a:lnSpc>
+            </a:pPr>
+            <a:r>
               <a:rPr lang="pt-PT" sz="1800" b="0" strike="noStrike" spc="-1" dirty="0" err="1">
                 <a:solidFill>
                   <a:srgbClr val="004B87"/>
                 </a:solidFill>
                 <a:latin typeface="Calibri"/>
               </a:rPr>
-              <a:t>Up</a:t>
+              <a:t>Videos</a:t>
             </a:r>
             <a:r>
               <a:rPr lang="pt-PT" sz="1800" b="0" strike="noStrike" spc="-1" dirty="0">
@@ -3791,16 +3827,41 @@
                 </a:solidFill>
                 <a:latin typeface="Calibri"/>
               </a:rPr>
-              <a:t> to 5 </a:t>
-            </a:r>
-            <a:r>
-              <a:rPr lang="pt-PT" sz="1800" b="0" strike="noStrike" spc="-1" dirty="0" err="1">
-                <a:solidFill>
-                  <a:srgbClr val="004B87"/>
-                </a:solidFill>
-                <a:latin typeface="Calibri"/>
-              </a:rPr>
-              <a:t>references</a:t>
+              <a:t> tutorial</a:t>
+            </a:r>
+          </a:p>
+          <a:p>
+            <a:pPr algn="just">
+              <a:lnSpc>
+                <a:spcPts val="2100"/>
+              </a:lnSpc>
+            </a:pPr>
+            <a:r>
+              <a:rPr lang="pt-PT" spc="-1" dirty="0" err="1">
+                <a:solidFill>
+                  <a:srgbClr val="004B87"/>
+                </a:solidFill>
+                <a:latin typeface="Calibri"/>
+              </a:rPr>
+              <a:t>StackOverflow</a:t>
+            </a:r>
+            <a:r>
+              <a:rPr lang="pt-PT" spc="-1" dirty="0">
+                <a:solidFill>
+                  <a:srgbClr val="004B87"/>
+                </a:solidFill>
+                <a:latin typeface="Calibri"/>
+              </a:rPr>
+              <a:t> o que </a:t>
+            </a:r>
+            <a:r>
+              <a:rPr lang="pt-PT" spc="-1">
+                <a:solidFill>
+                  <a:srgbClr val="004B87"/>
+                </a:solidFill>
+                <a:latin typeface="Calibri"/>
+              </a:rPr>
+              <a:t>foi pesquisado</a:t>
             </a:r>
             <a:endParaRPr lang="en-US" sz="1800" b="0" strike="noStrike" spc="-1" dirty="0">
               <a:latin typeface="Arial"/>

</xml_diff>